<commit_message>
Adjusted small errors in the notebook
</commit_message>
<xml_diff>
--- a/Microsoft_Studios_Project.pptx
+++ b/Microsoft_Studios_Project.pptx
@@ -4429,36 +4429,6 @@
           </a:p>
         </p:txBody>
       </p:sp>
-      <p:pic>
-        <p:nvPicPr>
-          <p:cNvPr id="13" name="Picture 12">
-            <a:extLst>
-              <a:ext uri="{FF2B5EF4-FFF2-40B4-BE49-F238E27FC236}">
-                <a16:creationId xmlns:a16="http://schemas.microsoft.com/office/drawing/2014/main" id="{592D1D95-86D7-1E60-B4CE-6D356EBBD3DD}"/>
-              </a:ext>
-            </a:extLst>
-          </p:cNvPr>
-          <p:cNvPicPr>
-            <a:picLocks noChangeAspect="1"/>
-          </p:cNvPicPr>
-          <p:nvPr/>
-        </p:nvPicPr>
-        <p:blipFill>
-          <a:blip r:embed="rId3"/>
-          <a:stretch>
-            <a:fillRect/>
-          </a:stretch>
-        </p:blipFill>
-        <p:spPr>
-          <a:xfrm>
-            <a:off x="62866" y="789587"/>
-            <a:ext cx="7280043" cy="6050695"/>
-          </a:xfrm>
-          <a:prstGeom prst="rect">
-            <a:avLst/>
-          </a:prstGeom>
-        </p:spPr>
-      </p:pic>
       <p:grpSp>
         <p:nvGrpSpPr>
           <p:cNvPr id="15" name="Group 14">
@@ -4514,10 +4484,10 @@
               <p:nvPr/>
             </p:nvPicPr>
             <p:blipFill>
-              <a:blip r:embed="rId4">
+              <a:blip r:embed="rId3">
                 <a:extLst>
                   <a:ext uri="{837473B0-CC2E-450A-ABE3-18F120FF3D39}">
-                    <a1611:picAttrSrcUrl xmlns:a1611="http://schemas.microsoft.com/office/drawing/2016/11/main" r:id="rId5"/>
+                    <a1611:picAttrSrcUrl xmlns:a1611="http://schemas.microsoft.com/office/drawing/2016/11/main" r:id="rId4"/>
                   </a:ext>
                 </a:extLst>
               </a:blip>
@@ -4550,10 +4520,10 @@
               <p:nvPr/>
             </p:nvPicPr>
             <p:blipFill>
-              <a:blip r:embed="rId6">
+              <a:blip r:embed="rId5">
                 <a:extLst>
                   <a:ext uri="{837473B0-CC2E-450A-ABE3-18F120FF3D39}">
-                    <a1611:picAttrSrcUrl xmlns:a1611="http://schemas.microsoft.com/office/drawing/2016/11/main" r:id="rId7"/>
+                    <a1611:picAttrSrcUrl xmlns:a1611="http://schemas.microsoft.com/office/drawing/2016/11/main" r:id="rId6"/>
                   </a:ext>
                 </a:extLst>
               </a:blip>
@@ -4587,10 +4557,10 @@
             <p:nvPr/>
           </p:nvPicPr>
           <p:blipFill>
-            <a:blip r:embed="rId4">
+            <a:blip r:embed="rId3">
               <a:extLst>
                 <a:ext uri="{837473B0-CC2E-450A-ABE3-18F120FF3D39}">
-                  <a1611:picAttrSrcUrl xmlns:a1611="http://schemas.microsoft.com/office/drawing/2016/11/main" r:id="rId5"/>
+                  <a1611:picAttrSrcUrl xmlns:a1611="http://schemas.microsoft.com/office/drawing/2016/11/main" r:id="rId4"/>
                 </a:ext>
               </a:extLst>
             </a:blip>
@@ -4677,6 +4647,36 @@
           </a:p>
         </p:txBody>
       </p:sp>
+      <p:pic>
+        <p:nvPicPr>
+          <p:cNvPr id="19" name="Picture 18">
+            <a:extLst>
+              <a:ext uri="{FF2B5EF4-FFF2-40B4-BE49-F238E27FC236}">
+                <a16:creationId xmlns:a16="http://schemas.microsoft.com/office/drawing/2014/main" id="{3D3A6E74-20E6-00F1-9505-B347A7D86829}"/>
+              </a:ext>
+            </a:extLst>
+          </p:cNvPr>
+          <p:cNvPicPr>
+            <a:picLocks noChangeAspect="1"/>
+          </p:cNvPicPr>
+          <p:nvPr/>
+        </p:nvPicPr>
+        <p:blipFill>
+          <a:blip r:embed="rId7"/>
+          <a:stretch>
+            <a:fillRect/>
+          </a:stretch>
+        </p:blipFill>
+        <p:spPr>
+          <a:xfrm>
+            <a:off x="163441" y="775732"/>
+            <a:ext cx="7060323" cy="5991228"/>
+          </a:xfrm>
+          <a:prstGeom prst="rect">
+            <a:avLst/>
+          </a:prstGeom>
+        </p:spPr>
+      </p:pic>
     </p:spTree>
     <p:extLst>
       <p:ext uri="{BB962C8B-B14F-4D97-AF65-F5344CB8AC3E}">
@@ -4935,36 +4935,6 @@
           </p:spPr>
         </p:pic>
       </p:grpSp>
-      <p:pic>
-        <p:nvPicPr>
-          <p:cNvPr id="19" name="Picture 18">
-            <a:extLst>
-              <a:ext uri="{FF2B5EF4-FFF2-40B4-BE49-F238E27FC236}">
-                <a16:creationId xmlns:a16="http://schemas.microsoft.com/office/drawing/2014/main" id="{8B2F430D-CFA6-D683-571A-4C59EB387FC1}"/>
-              </a:ext>
-            </a:extLst>
-          </p:cNvPr>
-          <p:cNvPicPr>
-            <a:picLocks noChangeAspect="1"/>
-          </p:cNvPicPr>
-          <p:nvPr/>
-        </p:nvPicPr>
-        <p:blipFill>
-          <a:blip r:embed="rId4"/>
-          <a:stretch>
-            <a:fillRect/>
-          </a:stretch>
-        </p:blipFill>
-        <p:spPr>
-          <a:xfrm>
-            <a:off x="764557" y="1430696"/>
-            <a:ext cx="10148454" cy="3996607"/>
-          </a:xfrm>
-          <a:prstGeom prst="rect">
-            <a:avLst/>
-          </a:prstGeom>
-        </p:spPr>
-      </p:pic>
       <p:sp>
         <p:nvSpPr>
           <p:cNvPr id="20" name="Footer Placeholder 19">
@@ -5217,7 +5187,7 @@
             <p:nvPr/>
           </p:nvPicPr>
           <p:blipFill>
-            <a:blip r:embed="rId5">
+            <a:blip r:embed="rId4">
               <a:extLst>
                 <a:ext uri="{28A0092B-C50C-407E-A947-70E740481C1C}">
                   <a14:useLocalDpi xmlns:a14="http://schemas.microsoft.com/office/drawing/2010/main" val="0"/>
@@ -5250,6 +5220,36 @@
           </p:spPr>
         </p:pic>
       </p:grpSp>
+      <p:pic>
+        <p:nvPicPr>
+          <p:cNvPr id="29" name="Picture 28">
+            <a:extLst>
+              <a:ext uri="{FF2B5EF4-FFF2-40B4-BE49-F238E27FC236}">
+                <a16:creationId xmlns:a16="http://schemas.microsoft.com/office/drawing/2014/main" id="{C3082CDB-C029-289F-7471-8D256A4D3C17}"/>
+              </a:ext>
+            </a:extLst>
+          </p:cNvPr>
+          <p:cNvPicPr>
+            <a:picLocks noChangeAspect="1"/>
+          </p:cNvPicPr>
+          <p:nvPr/>
+        </p:nvPicPr>
+        <p:blipFill>
+          <a:blip r:embed="rId5"/>
+          <a:stretch>
+            <a:fillRect/>
+          </a:stretch>
+        </p:blipFill>
+        <p:spPr>
+          <a:xfrm>
+            <a:off x="1363203" y="1549514"/>
+            <a:ext cx="9064055" cy="3599511"/>
+          </a:xfrm>
+          <a:prstGeom prst="rect">
+            <a:avLst/>
+          </a:prstGeom>
+        </p:spPr>
+      </p:pic>
     </p:spTree>
     <p:extLst>
       <p:ext uri="{BB962C8B-B14F-4D97-AF65-F5344CB8AC3E}">
@@ -5282,10 +5282,10 @@
       </p:grpSpPr>
       <p:pic>
         <p:nvPicPr>
-          <p:cNvPr id="16" name="Picture 15">
-            <a:extLst>
-              <a:ext uri="{FF2B5EF4-FFF2-40B4-BE49-F238E27FC236}">
-                <a16:creationId xmlns:a16="http://schemas.microsoft.com/office/drawing/2014/main" id="{5F4317E0-09DF-7C77-48AF-D7D097ABB63A}"/>
+          <p:cNvPr id="28" name="Picture 27">
+            <a:extLst>
+              <a:ext uri="{FF2B5EF4-FFF2-40B4-BE49-F238E27FC236}">
+                <a16:creationId xmlns:a16="http://schemas.microsoft.com/office/drawing/2014/main" id="{0C880326-B514-DEC7-74C9-8A5A668B931A}"/>
               </a:ext>
             </a:extLst>
           </p:cNvPr>
@@ -5302,8 +5302,8 @@
         </p:blipFill>
         <p:spPr>
           <a:xfrm>
-            <a:off x="648650" y="1432266"/>
-            <a:ext cx="10772186" cy="3969697"/>
+            <a:off x="728557" y="1416641"/>
+            <a:ext cx="10589243" cy="4014014"/>
           </a:xfrm>
           <a:prstGeom prst="rect">
             <a:avLst/>
@@ -7651,7 +7651,7 @@
                   </a:outerShdw>
                 </a:effectLst>
               </a:rPr>
-              <a:t>~ 12 Billion Box Office Revenue</a:t>
+              <a:t>~ $12 Billion Box Office Revenue</a:t>
             </a:r>
           </a:p>
         </p:txBody>
@@ -11398,7 +11398,7 @@
             <a:pPr algn="r"/>
             <a:r>
               <a:rPr lang="en-US" dirty="0"/>
-              <a:t>Genre vs Ratings Analysis</a:t>
+              <a:t>Genre vs Reviews Analysis</a:t>
             </a:r>
           </a:p>
         </p:txBody>
@@ -11447,8 +11447,8 @@
         </p:nvSpPr>
         <p:spPr>
           <a:xfrm>
-            <a:off x="9683589" y="2656648"/>
-            <a:ext cx="2426119" cy="2585323"/>
+            <a:off x="9657182" y="2367053"/>
+            <a:ext cx="2426119" cy="3139321"/>
           </a:xfrm>
           <a:prstGeom prst="rect">
             <a:avLst/>
@@ -11461,15 +11461,6 @@
           </a:bodyPr>
           <a:lstStyle/>
           <a:p>
-            <a:r>
-              <a:rPr lang="en-US" dirty="0"/>
-              <a:t>Above Average: &gt; 6.4</a:t>
-            </a:r>
-          </a:p>
-          <a:p>
-            <a:endParaRPr lang="en-US" dirty="0"/>
-          </a:p>
-          <a:p>
             <a:pPr marL="342900" indent="-342900">
               <a:buFont typeface="+mj-lt"/>
               <a:buAutoNum type="arabicPeriod"/>
@@ -11478,6 +11469,10 @@
               <a:rPr lang="en-US" dirty="0"/>
               <a:t>Drama</a:t>
             </a:r>
+            <a:br>
+              <a:rPr lang="en-US" dirty="0"/>
+            </a:br>
+            <a:endParaRPr lang="en-US" dirty="0"/>
           </a:p>
           <a:p>
             <a:pPr marL="342900" indent="-342900">
@@ -11488,6 +11483,10 @@
               <a:rPr lang="en-US" dirty="0"/>
               <a:t>Adventure, Animation, Comedy</a:t>
             </a:r>
+            <a:br>
+              <a:rPr lang="en-US" dirty="0"/>
+            </a:br>
+            <a:endParaRPr lang="en-US" dirty="0"/>
           </a:p>
           <a:p>
             <a:pPr marL="342900" indent="-342900">
@@ -11498,6 +11497,10 @@
               <a:rPr lang="en-US" dirty="0"/>
               <a:t>Comedy, Drama </a:t>
             </a:r>
+            <a:br>
+              <a:rPr lang="en-US" dirty="0"/>
+            </a:br>
+            <a:endParaRPr lang="en-US" dirty="0"/>
           </a:p>
           <a:p>
             <a:pPr marL="342900" indent="-342900">
@@ -11508,6 +11511,10 @@
               <a:rPr lang="en-US" dirty="0"/>
               <a:t>Documentary</a:t>
             </a:r>
+            <a:br>
+              <a:rPr lang="en-US" dirty="0"/>
+            </a:br>
+            <a:endParaRPr lang="en-US" dirty="0"/>
           </a:p>
           <a:p>
             <a:pPr marL="342900" indent="-342900">
@@ -12011,7 +12018,7 @@
         <p:spPr>
           <a:xfrm>
             <a:off x="7847215" y="1983232"/>
-            <a:ext cx="4344785" cy="4247317"/>
+            <a:ext cx="4344785" cy="3693319"/>
           </a:xfrm>
           <a:prstGeom prst="rect">
             <a:avLst/>
@@ -12024,16 +12031,8 @@
           </a:bodyPr>
           <a:lstStyle/>
           <a:p>
-            <a:r>
-              <a:rPr lang="en-US" dirty="0"/>
-              <a:t>Above Average: &gt; 6.4</a:t>
-            </a:r>
-          </a:p>
-          <a:p>
-            <a:endParaRPr lang="en-US" dirty="0"/>
-          </a:p>
-          <a:p>
             <a:pPr marL="342900" indent="-342900">
+              <a:buFont typeface="+mj-lt"/>
               <a:buAutoNum type="arabicPeriod"/>
             </a:pPr>
             <a:r>
@@ -12131,36 +12130,6 @@
           </a:p>
         </p:txBody>
       </p:sp>
-      <p:pic>
-        <p:nvPicPr>
-          <p:cNvPr id="2" name="Picture 1">
-            <a:extLst>
-              <a:ext uri="{FF2B5EF4-FFF2-40B4-BE49-F238E27FC236}">
-                <a16:creationId xmlns:a16="http://schemas.microsoft.com/office/drawing/2014/main" id="{505A5578-7D38-BCEE-60BF-5F8E83A9427E}"/>
-              </a:ext>
-            </a:extLst>
-          </p:cNvPr>
-          <p:cNvPicPr>
-            <a:picLocks noChangeAspect="1"/>
-          </p:cNvPicPr>
-          <p:nvPr/>
-        </p:nvPicPr>
-        <p:blipFill>
-          <a:blip r:embed="rId3"/>
-          <a:stretch>
-            <a:fillRect/>
-          </a:stretch>
-        </p:blipFill>
-        <p:spPr>
-          <a:xfrm>
-            <a:off x="43624" y="850827"/>
-            <a:ext cx="7421205" cy="6007173"/>
-          </a:xfrm>
-          <a:prstGeom prst="rect">
-            <a:avLst/>
-          </a:prstGeom>
-        </p:spPr>
-      </p:pic>
       <p:sp>
         <p:nvSpPr>
           <p:cNvPr id="3" name="TextBox 2">
@@ -12243,10 +12212,10 @@
             <p:nvPr/>
           </p:nvPicPr>
           <p:blipFill>
-            <a:blip r:embed="rId4">
+            <a:blip r:embed="rId3">
               <a:extLst>
                 <a:ext uri="{837473B0-CC2E-450A-ABE3-18F120FF3D39}">
-                  <a1611:picAttrSrcUrl xmlns:a1611="http://schemas.microsoft.com/office/drawing/2016/11/main" r:id="rId5"/>
+                  <a1611:picAttrSrcUrl xmlns:a1611="http://schemas.microsoft.com/office/drawing/2016/11/main" r:id="rId4"/>
                 </a:ext>
               </a:extLst>
             </a:blip>
@@ -12279,10 +12248,10 @@
             <p:nvPr/>
           </p:nvPicPr>
           <p:blipFill>
-            <a:blip r:embed="rId6">
+            <a:blip r:embed="rId5">
               <a:extLst>
                 <a:ext uri="{837473B0-CC2E-450A-ABE3-18F120FF3D39}">
-                  <a1611:picAttrSrcUrl xmlns:a1611="http://schemas.microsoft.com/office/drawing/2016/11/main" r:id="rId7"/>
+                  <a1611:picAttrSrcUrl xmlns:a1611="http://schemas.microsoft.com/office/drawing/2016/11/main" r:id="rId6"/>
                 </a:ext>
               </a:extLst>
             </a:blip>
@@ -12315,10 +12284,10 @@
             <p:nvPr/>
           </p:nvPicPr>
           <p:blipFill>
-            <a:blip r:embed="rId4">
+            <a:blip r:embed="rId3">
               <a:extLst>
                 <a:ext uri="{837473B0-CC2E-450A-ABE3-18F120FF3D39}">
-                  <a1611:picAttrSrcUrl xmlns:a1611="http://schemas.microsoft.com/office/drawing/2016/11/main" r:id="rId5"/>
+                  <a1611:picAttrSrcUrl xmlns:a1611="http://schemas.microsoft.com/office/drawing/2016/11/main" r:id="rId4"/>
                 </a:ext>
               </a:extLst>
             </a:blip>
@@ -12391,6 +12360,70 @@
       </p:sp>
       <p:sp>
         <p:nvSpPr>
+          <p:cNvPr id="14" name="Slide Number Placeholder 13">
+            <a:extLst>
+              <a:ext uri="{FF2B5EF4-FFF2-40B4-BE49-F238E27FC236}">
+                <a16:creationId xmlns:a16="http://schemas.microsoft.com/office/drawing/2014/main" id="{9C438E29-D275-8FA0-6E82-D9DC7D66CB99}"/>
+              </a:ext>
+            </a:extLst>
+          </p:cNvPr>
+          <p:cNvSpPr>
+            <a:spLocks noGrp="1"/>
+          </p:cNvSpPr>
+          <p:nvPr>
+            <p:ph type="sldNum" sz="quarter" idx="12"/>
+          </p:nvPr>
+        </p:nvSpPr>
+        <p:spPr>
+          <a:xfrm>
+            <a:off x="11028218" y="6356350"/>
+            <a:ext cx="325582" cy="365125"/>
+          </a:xfrm>
+        </p:spPr>
+        <p:txBody>
+          <a:bodyPr/>
+          <a:lstStyle/>
+          <a:p>
+            <a:fld id="{9B1D7D9B-CDE6-6440-8F5F-ADF9B5401534}" type="slidenum">
+              <a:rPr lang="en-US" smtClean="0"/>
+              <a:t>8</a:t>
+            </a:fld>
+            <a:endParaRPr lang="en-US" dirty="0"/>
+          </a:p>
+        </p:txBody>
+      </p:sp>
+      <p:pic>
+        <p:nvPicPr>
+          <p:cNvPr id="15" name="Picture 14">
+            <a:extLst>
+              <a:ext uri="{FF2B5EF4-FFF2-40B4-BE49-F238E27FC236}">
+                <a16:creationId xmlns:a16="http://schemas.microsoft.com/office/drawing/2014/main" id="{49989458-5C79-905D-4F60-6836C2BE7C60}"/>
+              </a:ext>
+            </a:extLst>
+          </p:cNvPr>
+          <p:cNvPicPr>
+            <a:picLocks noChangeAspect="1"/>
+          </p:cNvPicPr>
+          <p:nvPr/>
+        </p:nvPicPr>
+        <p:blipFill>
+          <a:blip r:embed="rId7"/>
+          <a:stretch>
+            <a:fillRect/>
+          </a:stretch>
+        </p:blipFill>
+        <p:spPr>
+          <a:xfrm>
+            <a:off x="69860" y="743380"/>
+            <a:ext cx="7410940" cy="5830256"/>
+          </a:xfrm>
+          <a:prstGeom prst="rect">
+            <a:avLst/>
+          </a:prstGeom>
+        </p:spPr>
+      </p:pic>
+      <p:sp>
+        <p:nvSpPr>
           <p:cNvPr id="13" name="Footer Placeholder 12">
             <a:extLst>
               <a:ext uri="{FF2B5EF4-FFF2-40B4-BE49-F238E27FC236}">
@@ -12420,40 +12453,6 @@
               <a:rPr lang="en-US" dirty="0"/>
               <a:t>Movie Reviews Filter: Above Dataset Average 6.4</a:t>
             </a:r>
-          </a:p>
-        </p:txBody>
-      </p:sp>
-      <p:sp>
-        <p:nvSpPr>
-          <p:cNvPr id="14" name="Slide Number Placeholder 13">
-            <a:extLst>
-              <a:ext uri="{FF2B5EF4-FFF2-40B4-BE49-F238E27FC236}">
-                <a16:creationId xmlns:a16="http://schemas.microsoft.com/office/drawing/2014/main" id="{9C438E29-D275-8FA0-6E82-D9DC7D66CB99}"/>
-              </a:ext>
-            </a:extLst>
-          </p:cNvPr>
-          <p:cNvSpPr>
-            <a:spLocks noGrp="1"/>
-          </p:cNvSpPr>
-          <p:nvPr>
-            <p:ph type="sldNum" sz="quarter" idx="12"/>
-          </p:nvPr>
-        </p:nvSpPr>
-        <p:spPr>
-          <a:xfrm>
-            <a:off x="11028218" y="6356350"/>
-            <a:ext cx="325582" cy="365125"/>
-          </a:xfrm>
-        </p:spPr>
-        <p:txBody>
-          <a:bodyPr/>
-          <a:lstStyle/>
-          <a:p>
-            <a:fld id="{9B1D7D9B-CDE6-6440-8F5F-ADF9B5401534}" type="slidenum">
-              <a:rPr lang="en-US" smtClean="0"/>
-              <a:t>8</a:t>
-            </a:fld>
-            <a:endParaRPr lang="en-US" dirty="0"/>
           </a:p>
         </p:txBody>
       </p:sp>

</xml_diff>

<commit_message>
Updated legend for production budget
</commit_message>
<xml_diff>
--- a/Microsoft_Studios_Project.pptx
+++ b/Microsoft_Studios_Project.pptx
@@ -5282,10 +5282,10 @@
       </p:grpSpPr>
       <p:pic>
         <p:nvPicPr>
-          <p:cNvPr id="28" name="Picture 27">
-            <a:extLst>
-              <a:ext uri="{FF2B5EF4-FFF2-40B4-BE49-F238E27FC236}">
-                <a16:creationId xmlns:a16="http://schemas.microsoft.com/office/drawing/2014/main" id="{0C880326-B514-DEC7-74C9-8A5A668B931A}"/>
+          <p:cNvPr id="29" name="Picture 28">
+            <a:extLst>
+              <a:ext uri="{FF2B5EF4-FFF2-40B4-BE49-F238E27FC236}">
+                <a16:creationId xmlns:a16="http://schemas.microsoft.com/office/drawing/2014/main" id="{70607FFC-7321-ED9A-1B53-150455943E19}"/>
               </a:ext>
             </a:extLst>
           </p:cNvPr>
@@ -5302,8 +5302,8 @@
         </p:blipFill>
         <p:spPr>
           <a:xfrm>
-            <a:off x="728557" y="1416641"/>
-            <a:ext cx="10589243" cy="4014014"/>
+            <a:off x="764556" y="1427344"/>
+            <a:ext cx="10589243" cy="4022186"/>
           </a:xfrm>
           <a:prstGeom prst="rect">
             <a:avLst/>

</xml_diff>